<commit_message>
all JSON info working
</commit_message>
<xml_diff>
--- a/Teaching/jsEvents/JavaScript Events Demo.pptx
+++ b/Teaching/jsEvents/JavaScript Events Demo.pptx
@@ -14,9 +14,12 @@
     <p:sldId id="280" r:id="rId8"/>
     <p:sldId id="281" r:id="rId9"/>
     <p:sldId id="282" r:id="rId10"/>
-    <p:sldId id="283" r:id="rId11"/>
+    <p:sldId id="285" r:id="rId11"/>
     <p:sldId id="284" r:id="rId12"/>
-    <p:sldId id="258" r:id="rId13"/>
+    <p:sldId id="286" r:id="rId13"/>
+    <p:sldId id="287" r:id="rId14"/>
+    <p:sldId id="258" r:id="rId15"/>
+    <p:sldId id="288" r:id="rId16"/>
   </p:sldIdLst>
   <p:sldSz cx="12192000" cy="6858000"/>
   <p:notesSz cx="6858000" cy="9144000"/>
@@ -291,7 +294,7 @@
           <a:p>
             <a:fld id="{4BBA120B-4C6D-4506-A1CB-16833E4EC4E4}" type="datetimeFigureOut">
               <a:rPr lang="en-US" smtClean="0"/>
-              <a:t>10/3/2019</a:t>
+              <a:t>10/8/2019</a:t>
             </a:fld>
             <a:endParaRPr lang="en-US"/>
           </a:p>
@@ -524,7 +527,7 @@
           <a:p>
             <a:fld id="{4BBA120B-4C6D-4506-A1CB-16833E4EC4E4}" type="datetimeFigureOut">
               <a:rPr lang="en-US" smtClean="0"/>
-              <a:t>10/3/2019</a:t>
+              <a:t>10/8/2019</a:t>
             </a:fld>
             <a:endParaRPr lang="en-US"/>
           </a:p>
@@ -704,7 +707,7 @@
           <a:p>
             <a:fld id="{4BBA120B-4C6D-4506-A1CB-16833E4EC4E4}" type="datetimeFigureOut">
               <a:rPr lang="en-US" smtClean="0"/>
-              <a:t>10/3/2019</a:t>
+              <a:t>10/8/2019</a:t>
             </a:fld>
             <a:endParaRPr lang="en-US"/>
           </a:p>
@@ -879,7 +882,7 @@
           <a:p>
             <a:fld id="{4BBA120B-4C6D-4506-A1CB-16833E4EC4E4}" type="datetimeFigureOut">
               <a:rPr lang="en-US" smtClean="0"/>
-              <a:t>10/3/2019</a:t>
+              <a:t>10/8/2019</a:t>
             </a:fld>
             <a:endParaRPr lang="en-US"/>
           </a:p>
@@ -1133,7 +1136,7 @@
           <a:p>
             <a:fld id="{4BBA120B-4C6D-4506-A1CB-16833E4EC4E4}" type="datetimeFigureOut">
               <a:rPr lang="en-US" smtClean="0"/>
-              <a:t>10/3/2019</a:t>
+              <a:t>10/8/2019</a:t>
             </a:fld>
             <a:endParaRPr lang="en-US"/>
           </a:p>
@@ -1464,7 +1467,7 @@
           <a:p>
             <a:fld id="{4BBA120B-4C6D-4506-A1CB-16833E4EC4E4}" type="datetimeFigureOut">
               <a:rPr lang="en-US" smtClean="0"/>
-              <a:t>10/3/2019</a:t>
+              <a:t>10/8/2019</a:t>
             </a:fld>
             <a:endParaRPr lang="en-US"/>
           </a:p>
@@ -1915,7 +1918,7 @@
           <a:p>
             <a:fld id="{4BBA120B-4C6D-4506-A1CB-16833E4EC4E4}" type="datetimeFigureOut">
               <a:rPr lang="en-US" smtClean="0"/>
-              <a:t>10/3/2019</a:t>
+              <a:t>10/8/2019</a:t>
             </a:fld>
             <a:endParaRPr lang="en-US"/>
           </a:p>
@@ -2033,7 +2036,7 @@
           <a:p>
             <a:fld id="{4BBA120B-4C6D-4506-A1CB-16833E4EC4E4}" type="datetimeFigureOut">
               <a:rPr lang="en-US" smtClean="0"/>
-              <a:t>10/3/2019</a:t>
+              <a:t>10/8/2019</a:t>
             </a:fld>
             <a:endParaRPr lang="en-US"/>
           </a:p>
@@ -2128,7 +2131,7 @@
           <a:p>
             <a:fld id="{4BBA120B-4C6D-4506-A1CB-16833E4EC4E4}" type="datetimeFigureOut">
               <a:rPr lang="en-US" smtClean="0"/>
-              <a:t>10/3/2019</a:t>
+              <a:t>10/8/2019</a:t>
             </a:fld>
             <a:endParaRPr lang="en-US"/>
           </a:p>
@@ -2415,7 +2418,7 @@
           <a:p>
             <a:fld id="{4BBA120B-4C6D-4506-A1CB-16833E4EC4E4}" type="datetimeFigureOut">
               <a:rPr lang="en-US" smtClean="0"/>
-              <a:t>10/3/2019</a:t>
+              <a:t>10/8/2019</a:t>
             </a:fld>
             <a:endParaRPr lang="en-US"/>
           </a:p>
@@ -2737,7 +2740,7 @@
           <a:p>
             <a:fld id="{4BBA120B-4C6D-4506-A1CB-16833E4EC4E4}" type="datetimeFigureOut">
               <a:rPr lang="en-US" smtClean="0"/>
-              <a:t>10/3/2019</a:t>
+              <a:t>10/8/2019</a:t>
             </a:fld>
             <a:endParaRPr lang="en-US"/>
           </a:p>
@@ -2991,7 +2994,7 @@
           <a:p>
             <a:fld id="{4BBA120B-4C6D-4506-A1CB-16833E4EC4E4}" type="datetimeFigureOut">
               <a:rPr lang="en-US" smtClean="0"/>
-              <a:t>10/3/2019</a:t>
+              <a:t>10/8/2019</a:t>
             </a:fld>
             <a:endParaRPr lang="en-US"/>
           </a:p>
@@ -3605,16 +3608,10 @@
           <a:lstStyle/>
           <a:p>
             <a:r>
-              <a:rPr lang="en-US" sz="2000" dirty="0" err="1">
-                <a:latin typeface="Abadi" panose="020B0604020104020204" pitchFamily="34" charset="0"/>
-              </a:rPr>
-              <a:t>UiEvent</a:t>
-            </a:r>
-            <a:r>
               <a:rPr lang="en-US" sz="2000" dirty="0">
                 <a:latin typeface="Abadi" panose="020B0604020104020204" pitchFamily="34" charset="0"/>
               </a:rPr>
-              <a:t> / Event</a:t>
+              <a:t>Event</a:t>
             </a:r>
           </a:p>
         </p:txBody>
@@ -3648,11 +3645,26 @@
           <a:lstStyle/>
           <a:p>
             <a:r>
+              <a:rPr lang="en-US" sz="3200" b="1" dirty="0" err="1">
+                <a:latin typeface="Abadi" panose="020B0604020104020204" pitchFamily="34" charset="0"/>
+              </a:rPr>
+              <a:t>onplay</a:t>
+            </a:r>
+            <a:r>
               <a:rPr lang="en-US" sz="3200" b="1" dirty="0">
                 <a:latin typeface="Abadi" panose="020B0604020104020204" pitchFamily="34" charset="0"/>
               </a:rPr>
-              <a:t>onload - 2</a:t>
-            </a:r>
+              <a:t> / </a:t>
+            </a:r>
+            <a:r>
+              <a:rPr lang="en-US" sz="3200" b="1" dirty="0" err="1">
+                <a:latin typeface="Abadi" panose="020B0604020104020204" pitchFamily="34" charset="0"/>
+              </a:rPr>
+              <a:t>onpause</a:t>
+            </a:r>
+            <a:endParaRPr lang="en-US" sz="3200" b="1" dirty="0">
+              <a:latin typeface="Abadi" panose="020B0604020104020204" pitchFamily="34" charset="0"/>
+            </a:endParaRPr>
           </a:p>
           <a:p>
             <a:pPr marL="285750" indent="-285750">
@@ -3663,17 +3675,17 @@
               <a:rPr lang="en-US" sz="2400" dirty="0">
                 <a:latin typeface="Abadi" panose="020B0604020104020204" pitchFamily="34" charset="0"/>
               </a:rPr>
-              <a:t>Executes JavaScript when an element has loaded</a:t>
+              <a:t>Executes JavaScript when media has started to play or is paused</a:t>
             </a:r>
           </a:p>
         </p:txBody>
       </p:sp>
       <p:pic>
         <p:nvPicPr>
-          <p:cNvPr id="6" name="Picture 5">
+          <p:cNvPr id="4" name="Picture 3">
             <a:extLst>
               <a:ext uri="{FF2B5EF4-FFF2-40B4-BE49-F238E27FC236}">
-                <a16:creationId xmlns:a16="http://schemas.microsoft.com/office/drawing/2014/main" id="{DE80D3AC-8C36-4883-ACB7-23298D40410A}"/>
+                <a16:creationId xmlns:a16="http://schemas.microsoft.com/office/drawing/2014/main" id="{13F6E22F-C656-459E-84B6-ADC30C44A507}"/>
               </a:ext>
             </a:extLst>
           </p:cNvPr>
@@ -3690,8 +3702,8 @@
         </p:blipFill>
         <p:spPr>
           <a:xfrm>
-            <a:off x="1015127" y="2219721"/>
-            <a:ext cx="10636941" cy="3458408"/>
+            <a:off x="794594" y="2091340"/>
+            <a:ext cx="11194994" cy="3861785"/>
           </a:xfrm>
           <a:prstGeom prst="rect">
             <a:avLst/>
@@ -3701,7 +3713,7 @@
     </p:spTree>
     <p:extLst>
       <p:ext uri="{BB962C8B-B14F-4D97-AF65-F5344CB8AC3E}">
-        <p14:creationId xmlns:p14="http://schemas.microsoft.com/office/powerpoint/2010/main" val="2047959479"/>
+        <p14:creationId xmlns:p14="http://schemas.microsoft.com/office/powerpoint/2010/main" val="3131192173"/>
       </p:ext>
     </p:extLst>
   </p:cSld>
@@ -3934,6 +3946,310 @@
       </p:grpSpPr>
       <p:sp>
         <p:nvSpPr>
+          <p:cNvPr id="2" name="TextBox 1">
+            <a:extLst>
+              <a:ext uri="{FF2B5EF4-FFF2-40B4-BE49-F238E27FC236}">
+                <a16:creationId xmlns:a16="http://schemas.microsoft.com/office/drawing/2014/main" id="{7BA07FEA-75B3-4BE4-A1F1-41D20448C027}"/>
+              </a:ext>
+            </a:extLst>
+          </p:cNvPr>
+          <p:cNvSpPr txBox="1"/>
+          <p:nvPr/>
+        </p:nvSpPr>
+        <p:spPr>
+          <a:xfrm>
+            <a:off x="654232" y="175088"/>
+            <a:ext cx="9953625" cy="400110"/>
+          </a:xfrm>
+          <a:prstGeom prst="rect">
+            <a:avLst/>
+          </a:prstGeom>
+          <a:noFill/>
+        </p:spPr>
+        <p:txBody>
+          <a:bodyPr wrap="square" rtlCol="0">
+            <a:spAutoFit/>
+          </a:bodyPr>
+          <a:lstStyle/>
+          <a:p>
+            <a:r>
+              <a:rPr lang="en-US" sz="2000" dirty="0" err="1">
+                <a:latin typeface="Abadi" panose="020B0604020104020204" pitchFamily="34" charset="0"/>
+              </a:rPr>
+              <a:t>TouchEvent</a:t>
+            </a:r>
+            <a:endParaRPr lang="en-US" sz="2000" dirty="0">
+              <a:latin typeface="Abadi" panose="020B0604020104020204" pitchFamily="34" charset="0"/>
+            </a:endParaRPr>
+          </a:p>
+        </p:txBody>
+      </p:sp>
+      <p:sp>
+        <p:nvSpPr>
+          <p:cNvPr id="3" name="TextBox 2">
+            <a:extLst>
+              <a:ext uri="{FF2B5EF4-FFF2-40B4-BE49-F238E27FC236}">
+                <a16:creationId xmlns:a16="http://schemas.microsoft.com/office/drawing/2014/main" id="{B3B1405C-CA1C-4D39-B66A-CA272BFB5BE4}"/>
+              </a:ext>
+            </a:extLst>
+          </p:cNvPr>
+          <p:cNvSpPr txBox="1"/>
+          <p:nvPr/>
+        </p:nvSpPr>
+        <p:spPr>
+          <a:xfrm>
+            <a:off x="1180381" y="640853"/>
+            <a:ext cx="4000325" cy="1323439"/>
+          </a:xfrm>
+          <a:prstGeom prst="rect">
+            <a:avLst/>
+          </a:prstGeom>
+          <a:noFill/>
+        </p:spPr>
+        <p:txBody>
+          <a:bodyPr wrap="square" rtlCol="0">
+            <a:spAutoFit/>
+          </a:bodyPr>
+          <a:lstStyle/>
+          <a:p>
+            <a:r>
+              <a:rPr lang="en-US" sz="3200" b="1" dirty="0" err="1">
+                <a:latin typeface="Abadi" panose="020B0604020104020204" pitchFamily="34" charset="0"/>
+              </a:rPr>
+              <a:t>ontouchstart</a:t>
+            </a:r>
+            <a:endParaRPr lang="en-US" sz="3200" b="1" dirty="0">
+              <a:latin typeface="Abadi" panose="020B0604020104020204" pitchFamily="34" charset="0"/>
+            </a:endParaRPr>
+          </a:p>
+          <a:p>
+            <a:pPr marL="285750" indent="-285750">
+              <a:buFont typeface="Arial" panose="020B0604020202020204" pitchFamily="34" charset="0"/>
+              <a:buChar char="•"/>
+            </a:pPr>
+            <a:r>
+              <a:rPr lang="en-US" sz="2400" dirty="0">
+                <a:latin typeface="Abadi" panose="020B0604020104020204" pitchFamily="34" charset="0"/>
+              </a:rPr>
+              <a:t>Executes JavaScript when a user touches an element</a:t>
+            </a:r>
+          </a:p>
+        </p:txBody>
+      </p:sp>
+      <p:pic>
+        <p:nvPicPr>
+          <p:cNvPr id="4" name="Picture 3">
+            <a:extLst>
+              <a:ext uri="{FF2B5EF4-FFF2-40B4-BE49-F238E27FC236}">
+                <a16:creationId xmlns:a16="http://schemas.microsoft.com/office/drawing/2014/main" id="{4A2A1DA3-500A-4FB7-993B-D24B04D84A4A}"/>
+              </a:ext>
+            </a:extLst>
+          </p:cNvPr>
+          <p:cNvPicPr>
+            <a:picLocks noChangeAspect="1"/>
+          </p:cNvPicPr>
+          <p:nvPr/>
+        </p:nvPicPr>
+        <p:blipFill>
+          <a:blip r:embed="rId2"/>
+          <a:stretch>
+            <a:fillRect/>
+          </a:stretch>
+        </p:blipFill>
+        <p:spPr>
+          <a:xfrm>
+            <a:off x="976312" y="2224087"/>
+            <a:ext cx="10166388" cy="3357563"/>
+          </a:xfrm>
+          <a:prstGeom prst="rect">
+            <a:avLst/>
+          </a:prstGeom>
+        </p:spPr>
+      </p:pic>
+    </p:spTree>
+    <p:extLst>
+      <p:ext uri="{BB962C8B-B14F-4D97-AF65-F5344CB8AC3E}">
+        <p14:creationId xmlns:p14="http://schemas.microsoft.com/office/powerpoint/2010/main" val="3486416894"/>
+      </p:ext>
+    </p:extLst>
+  </p:cSld>
+  <p:clrMapOvr>
+    <a:masterClrMapping/>
+  </p:clrMapOvr>
+</p:sld>
+</file>
+
+<file path=ppt/slides/slide13.xml><?xml version="1.0" encoding="utf-8"?>
+<p:sld xmlns:a="http://schemas.openxmlformats.org/drawingml/2006/main" xmlns:r="http://schemas.openxmlformats.org/officeDocument/2006/relationships" xmlns:p="http://schemas.openxmlformats.org/presentationml/2006/main">
+  <p:cSld>
+    <p:spTree>
+      <p:nvGrpSpPr>
+        <p:cNvPr id="1" name=""/>
+        <p:cNvGrpSpPr/>
+        <p:nvPr/>
+      </p:nvGrpSpPr>
+      <p:grpSpPr>
+        <a:xfrm>
+          <a:off x="0" y="0"/>
+          <a:ext cx="0" cy="0"/>
+          <a:chOff x="0" y="0"/>
+          <a:chExt cx="0" cy="0"/>
+        </a:xfrm>
+      </p:grpSpPr>
+      <p:sp>
+        <p:nvSpPr>
+          <p:cNvPr id="2" name="TextBox 1">
+            <a:extLst>
+              <a:ext uri="{FF2B5EF4-FFF2-40B4-BE49-F238E27FC236}">
+                <a16:creationId xmlns:a16="http://schemas.microsoft.com/office/drawing/2014/main" id="{7BA07FEA-75B3-4BE4-A1F1-41D20448C027}"/>
+              </a:ext>
+            </a:extLst>
+          </p:cNvPr>
+          <p:cNvSpPr txBox="1"/>
+          <p:nvPr/>
+        </p:nvSpPr>
+        <p:spPr>
+          <a:xfrm>
+            <a:off x="654232" y="175088"/>
+            <a:ext cx="9953625" cy="400110"/>
+          </a:xfrm>
+          <a:prstGeom prst="rect">
+            <a:avLst/>
+          </a:prstGeom>
+          <a:noFill/>
+        </p:spPr>
+        <p:txBody>
+          <a:bodyPr wrap="square" rtlCol="0">
+            <a:spAutoFit/>
+          </a:bodyPr>
+          <a:lstStyle/>
+          <a:p>
+            <a:r>
+              <a:rPr lang="en-US" sz="2000" dirty="0" err="1">
+                <a:latin typeface="Abadi" panose="020B0604020104020204" pitchFamily="34" charset="0"/>
+              </a:rPr>
+              <a:t>TouchEvent</a:t>
+            </a:r>
+            <a:endParaRPr lang="en-US" sz="2000" dirty="0">
+              <a:latin typeface="Abadi" panose="020B0604020104020204" pitchFamily="34" charset="0"/>
+            </a:endParaRPr>
+          </a:p>
+        </p:txBody>
+      </p:sp>
+      <p:sp>
+        <p:nvSpPr>
+          <p:cNvPr id="6" name="TextBox 5">
+            <a:extLst>
+              <a:ext uri="{FF2B5EF4-FFF2-40B4-BE49-F238E27FC236}">
+                <a16:creationId xmlns:a16="http://schemas.microsoft.com/office/drawing/2014/main" id="{EC33A9FA-B429-4924-9EDF-A7F69036809E}"/>
+              </a:ext>
+            </a:extLst>
+          </p:cNvPr>
+          <p:cNvSpPr txBox="1"/>
+          <p:nvPr/>
+        </p:nvSpPr>
+        <p:spPr>
+          <a:xfrm>
+            <a:off x="1188155" y="680324"/>
+            <a:ext cx="4699014" cy="1323439"/>
+          </a:xfrm>
+          <a:prstGeom prst="rect">
+            <a:avLst/>
+          </a:prstGeom>
+          <a:noFill/>
+        </p:spPr>
+        <p:txBody>
+          <a:bodyPr wrap="square" rtlCol="0">
+            <a:spAutoFit/>
+          </a:bodyPr>
+          <a:lstStyle/>
+          <a:p>
+            <a:r>
+              <a:rPr lang="en-US" sz="3200" b="1" dirty="0" err="1">
+                <a:latin typeface="Abadi" panose="020B0604020104020204" pitchFamily="34" charset="0"/>
+              </a:rPr>
+              <a:t>ontouchmove</a:t>
+            </a:r>
+            <a:endParaRPr lang="en-US" sz="3200" b="1" dirty="0">
+              <a:latin typeface="Abadi" panose="020B0604020104020204" pitchFamily="34" charset="0"/>
+            </a:endParaRPr>
+          </a:p>
+          <a:p>
+            <a:pPr marL="285750" indent="-285750">
+              <a:buFont typeface="Arial" panose="020B0604020202020204" pitchFamily="34" charset="0"/>
+              <a:buChar char="•"/>
+            </a:pPr>
+            <a:r>
+              <a:rPr lang="en-US" sz="2400" dirty="0">
+                <a:latin typeface="Abadi" panose="020B0604020104020204" pitchFamily="34" charset="0"/>
+              </a:rPr>
+              <a:t>Executes JavaScript when a user moves a finger over an element</a:t>
+            </a:r>
+          </a:p>
+        </p:txBody>
+      </p:sp>
+      <p:pic>
+        <p:nvPicPr>
+          <p:cNvPr id="4" name="Picture 3">
+            <a:extLst>
+              <a:ext uri="{FF2B5EF4-FFF2-40B4-BE49-F238E27FC236}">
+                <a16:creationId xmlns:a16="http://schemas.microsoft.com/office/drawing/2014/main" id="{5A5657B5-AB35-4463-AE42-3AEF0FD00A8E}"/>
+              </a:ext>
+            </a:extLst>
+          </p:cNvPr>
+          <p:cNvPicPr>
+            <a:picLocks noChangeAspect="1"/>
+          </p:cNvPicPr>
+          <p:nvPr/>
+        </p:nvPicPr>
+        <p:blipFill>
+          <a:blip r:embed="rId2"/>
+          <a:stretch>
+            <a:fillRect/>
+          </a:stretch>
+        </p:blipFill>
+        <p:spPr>
+          <a:xfrm>
+            <a:off x="945356" y="2234862"/>
+            <a:ext cx="10301288" cy="4260503"/>
+          </a:xfrm>
+          <a:prstGeom prst="rect">
+            <a:avLst/>
+          </a:prstGeom>
+        </p:spPr>
+      </p:pic>
+    </p:spTree>
+    <p:extLst>
+      <p:ext uri="{BB962C8B-B14F-4D97-AF65-F5344CB8AC3E}">
+        <p14:creationId xmlns:p14="http://schemas.microsoft.com/office/powerpoint/2010/main" val="485969117"/>
+      </p:ext>
+    </p:extLst>
+  </p:cSld>
+  <p:clrMapOvr>
+    <a:masterClrMapping/>
+  </p:clrMapOvr>
+</p:sld>
+</file>
+
+<file path=ppt/slides/slide14.xml><?xml version="1.0" encoding="utf-8"?>
+<p:sld xmlns:a="http://schemas.openxmlformats.org/drawingml/2006/main" xmlns:r="http://schemas.openxmlformats.org/officeDocument/2006/relationships" xmlns:p="http://schemas.openxmlformats.org/presentationml/2006/main">
+  <p:cSld>
+    <p:spTree>
+      <p:nvGrpSpPr>
+        <p:cNvPr id="1" name=""/>
+        <p:cNvGrpSpPr/>
+        <p:nvPr/>
+      </p:nvGrpSpPr>
+      <p:grpSpPr>
+        <a:xfrm>
+          <a:off x="0" y="0"/>
+          <a:ext cx="0" cy="0"/>
+          <a:chOff x="0" y="0"/>
+          <a:chExt cx="0" cy="0"/>
+        </a:xfrm>
+      </p:grpSpPr>
+      <p:sp>
+        <p:nvSpPr>
           <p:cNvPr id="3" name="TextBox 2">
             <a:extLst>
               <a:ext uri="{FF2B5EF4-FFF2-40B4-BE49-F238E27FC236}">
@@ -3964,7 +4280,7 @@
               <a:rPr lang="en-US" sz="2000" dirty="0">
                 <a:latin typeface="Abadi" panose="020B0604020104020204" pitchFamily="34" charset="0"/>
               </a:rPr>
-              <a:t>3 Ways </a:t>
+              <a:t>3 Ways to code events </a:t>
             </a:r>
           </a:p>
         </p:txBody>
@@ -4132,6 +4448,135 @@
     <p:extLst>
       <p:ext uri="{BB962C8B-B14F-4D97-AF65-F5344CB8AC3E}">
         <p14:creationId xmlns:p14="http://schemas.microsoft.com/office/powerpoint/2010/main" val="235498466"/>
+      </p:ext>
+    </p:extLst>
+  </p:cSld>
+  <p:clrMapOvr>
+    <a:masterClrMapping/>
+  </p:clrMapOvr>
+</p:sld>
+</file>
+
+<file path=ppt/slides/slide15.xml><?xml version="1.0" encoding="utf-8"?>
+<p:sld xmlns:a="http://schemas.openxmlformats.org/drawingml/2006/main" xmlns:r="http://schemas.openxmlformats.org/officeDocument/2006/relationships" xmlns:p="http://schemas.openxmlformats.org/presentationml/2006/main">
+  <p:cSld>
+    <p:spTree>
+      <p:nvGrpSpPr>
+        <p:cNvPr id="1" name=""/>
+        <p:cNvGrpSpPr/>
+        <p:nvPr/>
+      </p:nvGrpSpPr>
+      <p:grpSpPr>
+        <a:xfrm>
+          <a:off x="0" y="0"/>
+          <a:ext cx="0" cy="0"/>
+          <a:chOff x="0" y="0"/>
+          <a:chExt cx="0" cy="0"/>
+        </a:xfrm>
+      </p:grpSpPr>
+      <p:sp>
+        <p:nvSpPr>
+          <p:cNvPr id="5" name="TextBox 4">
+            <a:extLst>
+              <a:ext uri="{FF2B5EF4-FFF2-40B4-BE49-F238E27FC236}">
+                <a16:creationId xmlns:a16="http://schemas.microsoft.com/office/drawing/2014/main" id="{75DED7DE-6B34-47AD-AD26-8FF9C76AB3FF}"/>
+              </a:ext>
+            </a:extLst>
+          </p:cNvPr>
+          <p:cNvSpPr txBox="1"/>
+          <p:nvPr/>
+        </p:nvSpPr>
+        <p:spPr>
+          <a:xfrm>
+            <a:off x="1188155" y="680324"/>
+            <a:ext cx="9288256" cy="2680862"/>
+          </a:xfrm>
+          <a:prstGeom prst="rect">
+            <a:avLst/>
+          </a:prstGeom>
+          <a:noFill/>
+        </p:spPr>
+        <p:txBody>
+          <a:bodyPr wrap="square" rtlCol="0">
+            <a:spAutoFit/>
+          </a:bodyPr>
+          <a:lstStyle/>
+          <a:p>
+            <a:r>
+              <a:rPr lang="en-US" sz="3200" b="1" dirty="0">
+                <a:latin typeface="Abadi" panose="020B0604020104020204" pitchFamily="34" charset="0"/>
+              </a:rPr>
+              <a:t>References:</a:t>
+            </a:r>
+          </a:p>
+          <a:p>
+            <a:endParaRPr lang="en-US" sz="3200" b="1" dirty="0">
+              <a:latin typeface="Abadi" panose="020B0604020104020204" pitchFamily="34" charset="0"/>
+            </a:endParaRPr>
+          </a:p>
+          <a:p>
+            <a:pPr marL="342900" indent="-342900">
+              <a:lnSpc>
+                <a:spcPct val="150000"/>
+              </a:lnSpc>
+              <a:buFont typeface="Arial" panose="020B0604020202020204" pitchFamily="34" charset="0"/>
+              <a:buChar char="•"/>
+            </a:pPr>
+            <a:r>
+              <a:rPr lang="en-US" sz="2400" dirty="0">
+                <a:latin typeface="Abadi" panose="020B0604020104020204" pitchFamily="34" charset="0"/>
+              </a:rPr>
+              <a:t>w3schools.com/</a:t>
+            </a:r>
+            <a:r>
+              <a:rPr lang="en-US" sz="2400" dirty="0" err="1">
+                <a:latin typeface="Abadi" panose="020B0604020104020204" pitchFamily="34" charset="0"/>
+              </a:rPr>
+              <a:t>jsref</a:t>
+            </a:r>
+            <a:r>
+              <a:rPr lang="en-US" sz="2400" dirty="0">
+                <a:latin typeface="Abadi" panose="020B0604020104020204" pitchFamily="34" charset="0"/>
+              </a:rPr>
+              <a:t>/dom_obj_event.asp</a:t>
+            </a:r>
+          </a:p>
+          <a:p>
+            <a:pPr marL="342900" indent="-342900">
+              <a:lnSpc>
+                <a:spcPct val="150000"/>
+              </a:lnSpc>
+              <a:buFont typeface="Arial" panose="020B0604020202020204" pitchFamily="34" charset="0"/>
+              <a:buChar char="•"/>
+            </a:pPr>
+            <a:r>
+              <a:rPr lang="en-US" sz="2400" dirty="0">
+                <a:latin typeface="Abadi" panose="020B0604020104020204" pitchFamily="34" charset="0"/>
+              </a:rPr>
+              <a:t>https://www.tutorialspoint.com/javascript/javascript_events.htm</a:t>
+            </a:r>
+          </a:p>
+          <a:p>
+            <a:pPr marL="342900" indent="-342900">
+              <a:lnSpc>
+                <a:spcPct val="150000"/>
+              </a:lnSpc>
+              <a:buFont typeface="Arial" panose="020B0604020202020204" pitchFamily="34" charset="0"/>
+              <a:buChar char="•"/>
+            </a:pPr>
+            <a:r>
+              <a:rPr lang="en-US" sz="2400" dirty="0">
+                <a:latin typeface="Abadi" panose="020B0604020104020204" pitchFamily="34" charset="0"/>
+              </a:rPr>
+              <a:t>https://www.geeksforgeeks.org/javascript-events/</a:t>
+            </a:r>
+          </a:p>
+        </p:txBody>
+      </p:sp>
+    </p:spTree>
+    <p:extLst>
+      <p:ext uri="{BB962C8B-B14F-4D97-AF65-F5344CB8AC3E}">
+        <p14:creationId xmlns:p14="http://schemas.microsoft.com/office/powerpoint/2010/main" val="3353474977"/>
       </p:ext>
     </p:extLst>
   </p:cSld>
@@ -4192,6 +4637,12 @@
             </a:pPr>
             <a:r>
               <a:rPr lang="en-US" sz="2800" dirty="0">
+                <a:solidFill>
+                  <a:schemeClr val="bg1">
+                    <a:lumMod val="65000"/>
+                    <a:lumOff val="35000"/>
+                  </a:schemeClr>
+                </a:solidFill>
                 <a:latin typeface="Abadi" panose="020B0604020104020204" pitchFamily="34" charset="0"/>
               </a:rPr>
               <a:t>JavaScript Events are “things” that happen to HTML elements</a:t>
@@ -4425,6 +4876,12 @@
             </a:pPr>
             <a:r>
               <a:rPr lang="en-US" sz="2800" dirty="0">
+                <a:solidFill>
+                  <a:schemeClr val="bg1">
+                    <a:lumMod val="65000"/>
+                    <a:lumOff val="35000"/>
+                  </a:schemeClr>
+                </a:solidFill>
                 <a:latin typeface="Abadi" panose="020B0604020104020204" pitchFamily="34" charset="0"/>
               </a:rPr>
               <a:t>Events are a way to interact with the user on the page</a:t>
@@ -4466,6 +4923,12 @@
             </a:pPr>
             <a:r>
               <a:rPr lang="en-US" sz="2800" dirty="0">
+                <a:solidFill>
+                  <a:schemeClr val="bg1">
+                    <a:lumMod val="65000"/>
+                    <a:lumOff val="35000"/>
+                  </a:schemeClr>
+                </a:solidFill>
                 <a:latin typeface="Abadi" panose="020B0604020104020204" pitchFamily="34" charset="0"/>
               </a:rPr>
               <a:t>Events listen for something specific to happen and react in some way.</a:t>
@@ -5825,7 +6288,7 @@
               <a:rPr lang="en-US" sz="3200" b="1" dirty="0">
                 <a:latin typeface="Abadi" panose="020B0604020104020204" pitchFamily="34" charset="0"/>
               </a:rPr>
-              <a:t>onload - 1</a:t>
+              <a:t>onload </a:t>
             </a:r>
           </a:p>
           <a:p>

</xml_diff>